<commit_message>
Script BD e correções no LLD
</commit_message>
<xml_diff>
--- a/docs/hld-lld_HelpEnterprising.pptx
+++ b/docs/hld-lld_HelpEnterprising.pptx
@@ -4640,7 +4640,7 @@
                 <a:ea typeface="Fira Sans Compressed Medium"/>
                 <a:cs typeface="Fira Sans Compressed Medium"/>
               </a:rPr>
-              <a:t>Banco de dados MySQL SERVER</a:t>
+              <a:t>Banco de dados SQL SERVER</a:t>
             </a:r>
             <a:endParaRPr sz="2800" b="0">
               <a:solidFill>
@@ -4893,7 +4893,7 @@
         </p:blipFill>
         <p:spPr bwMode="auto">
           <a:xfrm rot="0" flipH="0" flipV="0">
-            <a:off x="1029074" y="7406244"/>
+            <a:off x="809265" y="7350076"/>
             <a:ext cx="1394271" cy="802265"/>
           </a:xfrm>
           <a:prstGeom prst="rect">
@@ -4909,7 +4909,7 @@
         </p:nvSpPr>
         <p:spPr bwMode="auto">
           <a:xfrm flipH="0" flipV="0">
-            <a:off x="131326" y="8235092"/>
+            <a:off x="-88481" y="8235091"/>
             <a:ext cx="3189767" cy="487325"/>
           </a:xfrm>
           <a:prstGeom prst="rect">
@@ -5385,6 +5385,235 @@
               <a:ea typeface="Fira Sans Compressed Medium"/>
               <a:cs typeface="Fira Sans Compressed Medium"/>
             </a:endParaRPr>
+          </a:p>
+        </p:txBody>
+      </p:sp>
+      <p:cxnSp>
+        <p:nvCxnSpPr>
+          <p:cNvPr id="37" name="" hidden="0"/>
+          <p:cNvCxnSpPr>
+            <a:cxnSpLocks/>
+            <a:endCxn id="32" idx="3"/>
+          </p:cNvCxnSpPr>
+          <p:nvPr isPhoto="0" userDrawn="0"/>
+        </p:nvCxnSpPr>
+        <p:spPr bwMode="auto">
+          <a:xfrm rot="10799990" flipH="0" flipV="1">
+            <a:off x="2203536" y="7644422"/>
+            <a:ext cx="1876264" cy="106786"/>
+          </a:xfrm>
+          <a:prstGeom prst="line">
+            <a:avLst/>
+          </a:prstGeom>
+          <a:ln w="28575" cap="flat" cmpd="sng" algn="ctr">
+            <a:solidFill>
+              <a:srgbClr val="6AA76A"/>
+            </a:solidFill>
+            <a:prstDash val="solid"/>
+            <a:tailEnd type="arrow" len="med"/>
+          </a:ln>
+        </p:spPr>
+        <p:style>
+          <a:lnRef idx="1">
+            <a:schemeClr val="accent1">
+              <a:shade val="50000"/>
+            </a:schemeClr>
+          </a:lnRef>
+          <a:fillRef idx="0">
+            <a:schemeClr val="accent1"/>
+          </a:fillRef>
+          <a:effectRef idx="0">
+            <a:schemeClr val="accent1"/>
+          </a:effectRef>
+          <a:fontRef idx="minor">
+            <a:schemeClr val="tx1"/>
+          </a:fontRef>
+        </p:style>
+      </p:cxnSp>
+      <p:sp>
+        <p:nvSpPr>
+          <p:cNvPr id="38" name="" hidden="0"/>
+          <p:cNvSpPr/>
+          <p:nvPr isPhoto="0" userDrawn="0"/>
+        </p:nvSpPr>
+        <p:spPr bwMode="auto">
+          <a:xfrm flipH="0" flipV="0">
+            <a:off x="4718398" y="8534941"/>
+            <a:ext cx="350851" cy="456657"/>
+          </a:xfrm>
+          <a:prstGeom prst="rect">
+            <a:avLst/>
+          </a:prstGeom>
+          <a:noFill/>
+        </p:spPr>
+        <p:txBody>
+          <a:bodyPr vertOverflow="overflow" horzOverflow="clip" vert="horz" wrap="square" lIns="91440" tIns="45720" rIns="91440" bIns="45720" numCol="1" spcCol="0" rtlCol="0" fromWordArt="0" anchor="t" anchorCtr="0" forceAA="0" upright="0" compatLnSpc="0">
+            <a:noAutofit/>
+          </a:bodyPr>
+          <a:p>
+            <a:pPr>
+              <a:defRPr/>
+            </a:pPr>
+            <a:r>
+              <a:rPr sz="2600" b="1"/>
+              <a:t>+</a:t>
+            </a:r>
+            <a:endParaRPr sz="2600" b="1"/>
+          </a:p>
+        </p:txBody>
+      </p:sp>
+      <p:cxnSp>
+        <p:nvCxnSpPr>
+          <p:cNvPr id="39" name="" hidden="0"/>
+          <p:cNvCxnSpPr>
+            <a:cxnSpLocks/>
+          </p:cNvCxnSpPr>
+          <p:nvPr isPhoto="0" userDrawn="0"/>
+        </p:nvCxnSpPr>
+        <p:spPr bwMode="auto">
+          <a:xfrm rot="16199969" flipH="0" flipV="1">
+            <a:off x="1128170" y="7397302"/>
+            <a:ext cx="857250" cy="0"/>
+          </a:xfrm>
+          <a:prstGeom prst="line">
+            <a:avLst/>
+          </a:prstGeom>
+          <a:ln w="28575" cap="flat" cmpd="sng" algn="ctr">
+            <a:solidFill>
+              <a:srgbClr val="6AA76A"/>
+            </a:solidFill>
+            <a:prstDash val="solid"/>
+            <a:tailEnd type="arrow" len="med"/>
+          </a:ln>
+        </p:spPr>
+        <p:style>
+          <a:lnRef idx="1">
+            <a:schemeClr val="accent1">
+              <a:shade val="50000"/>
+            </a:schemeClr>
+          </a:lnRef>
+          <a:fillRef idx="0">
+            <a:schemeClr val="accent1"/>
+          </a:fillRef>
+          <a:effectRef idx="0">
+            <a:schemeClr val="accent1"/>
+          </a:effectRef>
+          <a:fontRef idx="minor">
+            <a:schemeClr val="tx1"/>
+          </a:fontRef>
+        </p:style>
+      </p:cxnSp>
+      <p:cxnSp>
+        <p:nvCxnSpPr>
+          <p:cNvPr id="40" name="" hidden="0"/>
+          <p:cNvCxnSpPr>
+            <a:cxnSpLocks/>
+          </p:cNvCxnSpPr>
+          <p:nvPr isPhoto="0" userDrawn="0"/>
+        </p:nvCxnSpPr>
+        <p:spPr bwMode="auto">
+          <a:xfrm rot="10799990" flipH="0" flipV="1">
+            <a:off x="13949715" y="7730219"/>
+            <a:ext cx="1577984" cy="911508"/>
+          </a:xfrm>
+          <a:prstGeom prst="line">
+            <a:avLst/>
+          </a:prstGeom>
+          <a:ln w="28575" cap="flat" cmpd="sng" algn="ctr">
+            <a:solidFill>
+              <a:srgbClr val="6AA76A"/>
+            </a:solidFill>
+            <a:prstDash val="solid"/>
+            <a:tailEnd type="arrow" len="med"/>
+          </a:ln>
+        </p:spPr>
+        <p:style>
+          <a:lnRef idx="1">
+            <a:schemeClr val="accent1">
+              <a:shade val="50000"/>
+            </a:schemeClr>
+          </a:lnRef>
+          <a:fillRef idx="0">
+            <a:schemeClr val="accent1"/>
+          </a:fillRef>
+          <a:effectRef idx="0">
+            <a:schemeClr val="accent1"/>
+          </a:effectRef>
+          <a:fontRef idx="minor">
+            <a:schemeClr val="tx1"/>
+          </a:fontRef>
+        </p:style>
+      </p:cxnSp>
+      <p:cxnSp>
+        <p:nvCxnSpPr>
+          <p:cNvPr id="41" name="" hidden="0"/>
+          <p:cNvCxnSpPr>
+            <a:cxnSpLocks/>
+          </p:cNvCxnSpPr>
+          <p:nvPr isPhoto="0" userDrawn="0"/>
+        </p:nvCxnSpPr>
+        <p:spPr bwMode="auto">
+          <a:xfrm rot="5399978" flipH="0" flipV="0">
+            <a:off x="16299045" y="7225214"/>
+            <a:ext cx="438149" cy="360"/>
+          </a:xfrm>
+          <a:prstGeom prst="line">
+            <a:avLst/>
+          </a:prstGeom>
+          <a:ln w="28575" cap="flat" cmpd="sng" algn="ctr">
+            <a:solidFill>
+              <a:srgbClr val="6AA76A"/>
+            </a:solidFill>
+            <a:prstDash val="solid"/>
+            <a:tailEnd type="arrow" len="med"/>
+          </a:ln>
+        </p:spPr>
+        <p:style>
+          <a:lnRef idx="1">
+            <a:schemeClr val="accent1">
+              <a:shade val="50000"/>
+            </a:schemeClr>
+          </a:lnRef>
+          <a:fillRef idx="0">
+            <a:schemeClr val="accent1"/>
+          </a:fillRef>
+          <a:effectRef idx="0">
+            <a:schemeClr val="accent1"/>
+          </a:effectRef>
+          <a:fontRef idx="minor">
+            <a:schemeClr val="tx1"/>
+          </a:fontRef>
+        </p:style>
+      </p:cxnSp>
+      <p:sp>
+        <p:nvSpPr>
+          <p:cNvPr id="42" name="" hidden="0"/>
+          <p:cNvSpPr/>
+          <p:nvPr isPhoto="0" userDrawn="0"/>
+        </p:nvSpPr>
+        <p:spPr bwMode="auto">
+          <a:xfrm flipH="0" flipV="0">
+            <a:off x="11493330" y="8641728"/>
+            <a:ext cx="516288" cy="444755"/>
+          </a:xfrm>
+          <a:prstGeom prst="rect">
+            <a:avLst/>
+          </a:prstGeom>
+          <a:noFill/>
+        </p:spPr>
+        <p:txBody>
+          <a:bodyPr vertOverflow="overflow" horzOverflow="clip" vert="horz" wrap="square" lIns="91440" tIns="45720" rIns="91440" bIns="45720" numCol="1" spcCol="0" rtlCol="0" fromWordArt="0" anchor="t" anchorCtr="0" forceAA="0" upright="0" compatLnSpc="0">
+            <a:noAutofit/>
+          </a:bodyPr>
+          <a:p>
+            <a:pPr algn="ctr">
+              <a:defRPr/>
+            </a:pPr>
+            <a:r>
+              <a:rPr sz="2600" b="1"/>
+              <a:t>+</a:t>
+            </a:r>
+            <a:endParaRPr sz="2600" b="1"/>
           </a:p>
         </p:txBody>
       </p:sp>

</xml_diff>